<commit_message>
Update DEVELLOPEUR WEB ET WEB MOBILE.pptx
</commit_message>
<xml_diff>
--- a/DEVELLOPEUR WEB ET WEB MOBILE.pptx
+++ b/DEVELLOPEUR WEB ET WEB MOBILE.pptx
@@ -1923,7 +1923,7 @@
           <a:p>
             <a:fld id="{48A87A34-81AB-432B-8DAE-1953F412C126}" type="datetimeFigureOut">
               <a:rPr lang="en-US" smtClean="0"/>
-              <a:t>10/17/2019</a:t>
+              <a:t>10/18/2019</a:t>
             </a:fld>
             <a:endParaRPr lang="en-US" dirty="0"/>
           </a:p>
@@ -2338,7 +2338,7 @@
             <a:fld id="{48A87A34-81AB-432B-8DAE-1953F412C126}" type="datetimeFigureOut">
               <a:rPr lang="en-US" smtClean="0"/>
               <a:pPr/>
-              <a:t>10/17/2019</a:t>
+              <a:t>10/18/2019</a:t>
             </a:fld>
             <a:endParaRPr lang="en-US" dirty="0"/>
           </a:p>
@@ -2676,7 +2676,7 @@
             <a:fld id="{48A87A34-81AB-432B-8DAE-1953F412C126}" type="datetimeFigureOut">
               <a:rPr lang="en-US" smtClean="0"/>
               <a:pPr/>
-              <a:t>10/17/2019</a:t>
+              <a:t>10/18/2019</a:t>
             </a:fld>
             <a:endParaRPr lang="en-US" dirty="0"/>
           </a:p>
@@ -3083,7 +3083,7 @@
             <a:fld id="{48A87A34-81AB-432B-8DAE-1953F412C126}" type="datetimeFigureOut">
               <a:rPr lang="en-US" smtClean="0"/>
               <a:pPr/>
-              <a:t>10/17/2019</a:t>
+              <a:t>10/18/2019</a:t>
             </a:fld>
             <a:endParaRPr lang="en-US" dirty="0"/>
           </a:p>
@@ -3653,7 +3653,7 @@
             <a:fld id="{48A87A34-81AB-432B-8DAE-1953F412C126}" type="datetimeFigureOut">
               <a:rPr lang="en-US" smtClean="0"/>
               <a:pPr/>
-              <a:t>10/17/2019</a:t>
+              <a:t>10/18/2019</a:t>
             </a:fld>
             <a:endParaRPr lang="en-US" dirty="0"/>
           </a:p>
@@ -4336,7 +4336,7 @@
             <a:fld id="{48A87A34-81AB-432B-8DAE-1953F412C126}" type="datetimeFigureOut">
               <a:rPr lang="en-US" smtClean="0"/>
               <a:pPr/>
-              <a:t>10/17/2019</a:t>
+              <a:t>10/18/2019</a:t>
             </a:fld>
             <a:endParaRPr lang="en-US" dirty="0"/>
           </a:p>
@@ -5251,7 +5251,7 @@
             <a:fld id="{48A87A34-81AB-432B-8DAE-1953F412C126}" type="datetimeFigureOut">
               <a:rPr lang="en-US" smtClean="0"/>
               <a:pPr/>
-              <a:t>10/17/2019</a:t>
+              <a:t>10/18/2019</a:t>
             </a:fld>
             <a:endParaRPr lang="en-US" dirty="0"/>
           </a:p>
@@ -5566,7 +5566,7 @@
             <a:fld id="{48A87A34-81AB-432B-8DAE-1953F412C126}" type="datetimeFigureOut">
               <a:rPr lang="en-US" smtClean="0"/>
               <a:pPr/>
-              <a:t>10/17/2019</a:t>
+              <a:t>10/18/2019</a:t>
             </a:fld>
             <a:endParaRPr lang="en-US" dirty="0"/>
           </a:p>
@@ -5832,7 +5832,7 @@
             <a:fld id="{48A87A34-81AB-432B-8DAE-1953F412C126}" type="datetimeFigureOut">
               <a:rPr lang="en-US" smtClean="0"/>
               <a:pPr/>
-              <a:t>10/17/2019</a:t>
+              <a:t>10/18/2019</a:t>
             </a:fld>
             <a:endParaRPr lang="en-US" dirty="0"/>
           </a:p>
@@ -6022,7 +6022,7 @@
           <a:p>
             <a:fld id="{48A87A34-81AB-432B-8DAE-1953F412C126}" type="datetimeFigureOut">
               <a:rPr lang="en-US" dirty="0"/>
-              <a:t>10/17/2019</a:t>
+              <a:t>10/18/2019</a:t>
             </a:fld>
             <a:endParaRPr lang="en-US" dirty="0"/>
           </a:p>
@@ -6332,7 +6332,7 @@
             <a:fld id="{48A87A34-81AB-432B-8DAE-1953F412C126}" type="datetimeFigureOut">
               <a:rPr lang="en-US" smtClean="0"/>
               <a:pPr/>
-              <a:t>10/17/2019</a:t>
+              <a:t>10/18/2019</a:t>
             </a:fld>
             <a:endParaRPr lang="en-US" dirty="0"/>
           </a:p>
@@ -6722,7 +6722,7 @@
           <a:p>
             <a:fld id="{48A87A34-81AB-432B-8DAE-1953F412C126}" type="datetimeFigureOut">
               <a:rPr lang="en-US" smtClean="0"/>
-              <a:t>10/17/2019</a:t>
+              <a:t>10/18/2019</a:t>
             </a:fld>
             <a:endParaRPr lang="en-US" dirty="0"/>
           </a:p>
@@ -7099,7 +7099,7 @@
             <a:fld id="{48A87A34-81AB-432B-8DAE-1953F412C126}" type="datetimeFigureOut">
               <a:rPr lang="en-US" smtClean="0"/>
               <a:pPr/>
-              <a:t>10/17/2019</a:t>
+              <a:t>10/18/2019</a:t>
             </a:fld>
             <a:endParaRPr lang="en-US" dirty="0"/>
           </a:p>
@@ -7607,7 +7607,7 @@
             <a:fld id="{48A87A34-81AB-432B-8DAE-1953F412C126}" type="datetimeFigureOut">
               <a:rPr lang="en-US" smtClean="0"/>
               <a:pPr/>
-              <a:t>10/17/2019</a:t>
+              <a:t>10/18/2019</a:t>
             </a:fld>
             <a:endParaRPr lang="en-US" dirty="0"/>
           </a:p>
@@ -7865,7 +7865,7 @@
           <a:p>
             <a:fld id="{48A87A34-81AB-432B-8DAE-1953F412C126}" type="datetimeFigureOut">
               <a:rPr lang="en-US" smtClean="0"/>
-              <a:t>10/17/2019</a:t>
+              <a:t>10/18/2019</a:t>
             </a:fld>
             <a:endParaRPr lang="en-US" dirty="0"/>
           </a:p>
@@ -8028,7 +8028,7 @@
           <a:p>
             <a:fld id="{48A87A34-81AB-432B-8DAE-1953F412C126}" type="datetimeFigureOut">
               <a:rPr lang="en-US" smtClean="0"/>
-              <a:t>10/17/2019</a:t>
+              <a:t>10/18/2019</a:t>
             </a:fld>
             <a:endParaRPr lang="en-US" dirty="0"/>
           </a:p>
@@ -8419,7 +8419,7 @@
             <a:fld id="{48A87A34-81AB-432B-8DAE-1953F412C126}" type="datetimeFigureOut">
               <a:rPr lang="en-US" smtClean="0"/>
               <a:pPr/>
-              <a:t>10/17/2019</a:t>
+              <a:t>10/18/2019</a:t>
             </a:fld>
             <a:endParaRPr lang="en-US" dirty="0"/>
           </a:p>
@@ -8829,7 +8829,7 @@
           <a:p>
             <a:fld id="{48A87A34-81AB-432B-8DAE-1953F412C126}" type="datetimeFigureOut">
               <a:rPr lang="en-US" smtClean="0"/>
-              <a:t>10/17/2019</a:t>
+              <a:t>10/18/2019</a:t>
             </a:fld>
             <a:endParaRPr lang="en-US" dirty="0"/>
           </a:p>
@@ -9074,7 +9074,7 @@
             <a:fld id="{48A87A34-81AB-432B-8DAE-1953F412C126}" type="datetimeFigureOut">
               <a:rPr lang="en-US" smtClean="0"/>
               <a:pPr/>
-              <a:t>10/17/2019</a:t>
+              <a:t>10/18/2019</a:t>
             </a:fld>
             <a:endParaRPr lang="en-US" dirty="0"/>
           </a:p>
@@ -10580,7 +10580,7 @@
         <p:spPr>
           <a:xfrm>
             <a:off x="276225" y="539750"/>
-            <a:ext cx="9613900" cy="6301020"/>
+            <a:ext cx="9613900" cy="5951181"/>
           </a:xfrm>
           <a:prstGeom prst="rect">
             <a:avLst/>
@@ -10801,21 +10801,7 @@
                 <a:latin typeface="Calibri" panose="020F0502020204030204" pitchFamily="34" charset="0"/>
                 <a:cs typeface="Calibri" panose="020F0502020204030204" pitchFamily="34" charset="0"/>
               </a:rPr>
-              <a:t> » pour être la même que la taille de l'écran de l'appareil utilisé pour afficher le site. L'échelle d'affichage du site sera 100 % et l'échelle maximum également de 100</a:t>
-            </a:r>
-            <a:endParaRPr lang="fr-FR" sz="1600" i="1" dirty="0">
-              <a:latin typeface="Calibri" panose="020F0502020204030204" pitchFamily="34" charset="0"/>
-              <a:ea typeface="Calibri" panose="020F0502020204030204" pitchFamily="34" charset="0"/>
-              <a:cs typeface="Calibri" panose="020F0502020204030204" pitchFamily="34" charset="0"/>
-            </a:endParaRPr>
-          </a:p>
-          <a:p>
-            <a:r>
-              <a:rPr lang="fr-FR" sz="1600" dirty="0">
-                <a:latin typeface="Calibri" panose="020F0502020204030204" pitchFamily="34" charset="0"/>
-                <a:cs typeface="Calibri" panose="020F0502020204030204" pitchFamily="34" charset="0"/>
-              </a:rPr>
-              <a:t>%.</a:t>
+              <a:t> » pour être la même que la taille de l'écran de l'appareil utilisé pour afficher le site. L'échelle d'affichage du site sera 100 % et l'échelle maximum également de 100 %.</a:t>
             </a:r>
           </a:p>
           <a:p>

</xml_diff>